<commit_message>
ppts prática tinkercad microcontroladores 29032023
</commit_message>
<xml_diff>
--- a/01 Classes/Aula 03 - Programação Microcontroladores - Arduino Tinkercad.pptx
+++ b/01 Classes/Aula 03 - Programação Microcontroladores - Arduino Tinkercad.pptx
@@ -5884,18 +5884,31 @@
               <a:t>(“</a:t>
             </a:r>
             <a:r>
-              <a:rPr lang="pt-BR" sz="2000" dirty="0" err="1">
+              <a:rPr lang="pt-BR" sz="2000" b="1" dirty="0" err="1">
+                <a:solidFill>
+                  <a:srgbClr val="0070C0"/>
+                </a:solidFill>
                 <a:latin typeface="Times New Roman" panose="02020603050405020304" pitchFamily="18" charset="0"/>
                 <a:cs typeface="Times New Roman" panose="02020603050405020304" pitchFamily="18" charset="0"/>
               </a:rPr>
               <a:t>Hello</a:t>
             </a:r>
             <a:r>
-              <a:rPr lang="pt-BR" sz="2000" dirty="0">
-                <a:latin typeface="Times New Roman" panose="02020603050405020304" pitchFamily="18" charset="0"/>
-                <a:cs typeface="Times New Roman" panose="02020603050405020304" pitchFamily="18" charset="0"/>
-              </a:rPr>
-              <a:t> World”);</a:t>
+              <a:rPr lang="pt-BR" sz="2000" b="1" dirty="0">
+                <a:solidFill>
+                  <a:srgbClr val="0070C0"/>
+                </a:solidFill>
+                <a:latin typeface="Times New Roman" panose="02020603050405020304" pitchFamily="18" charset="0"/>
+                <a:cs typeface="Times New Roman" panose="02020603050405020304" pitchFamily="18" charset="0"/>
+              </a:rPr>
+              <a:t> World</a:t>
+            </a:r>
+            <a:r>
+              <a:rPr lang="pt-BR" sz="2000" dirty="0">
+                <a:latin typeface="Times New Roman" panose="02020603050405020304" pitchFamily="18" charset="0"/>
+                <a:cs typeface="Times New Roman" panose="02020603050405020304" pitchFamily="18" charset="0"/>
+              </a:rPr>
+              <a:t>”);</a:t>
             </a:r>
           </a:p>
           <a:p>
@@ -6643,7 +6656,7 @@
                 <a:latin typeface="Times New Roman" panose="02020603050405020304" pitchFamily="18" charset="0"/>
                 <a:cs typeface="Times New Roman" panose="02020603050405020304" pitchFamily="18" charset="0"/>
               </a:rPr>
-              <a:t>cátodo (-) ligar no GND</a:t>
+              <a:t>cátodo (-) ligar no resistor ou GND</a:t>
             </a:r>
             <a:r>
               <a:rPr lang="pt-BR" sz="1600" dirty="0">
@@ -6671,7 +6684,7 @@
                 <a:latin typeface="Times New Roman" panose="02020603050405020304" pitchFamily="18" charset="0"/>
                 <a:cs typeface="Times New Roman" panose="02020603050405020304" pitchFamily="18" charset="0"/>
               </a:rPr>
-              <a:t>resistor ou pino.</a:t>
+              <a:t>pino digital.</a:t>
             </a:r>
           </a:p>
           <a:p>
@@ -7143,21 +7156,21 @@
               <a:buNone/>
             </a:pPr>
             <a:r>
-              <a:rPr lang="pt-BR" sz="1800" dirty="0">
+              <a:rPr lang="pt-BR" sz="1600" dirty="0">
                 <a:latin typeface="Times New Roman" panose="02020603050405020304" pitchFamily="18" charset="0"/>
                 <a:cs typeface="Times New Roman" panose="02020603050405020304" pitchFamily="18" charset="0"/>
               </a:rPr>
               <a:t>#</a:t>
             </a:r>
             <a:r>
-              <a:rPr lang="pt-BR" sz="1800" b="1" dirty="0">
+              <a:rPr lang="pt-BR" sz="1600" b="1" dirty="0">
                 <a:latin typeface="Times New Roman" panose="02020603050405020304" pitchFamily="18" charset="0"/>
                 <a:cs typeface="Times New Roman" panose="02020603050405020304" pitchFamily="18" charset="0"/>
               </a:rPr>
               <a:t>define</a:t>
             </a:r>
             <a:r>
-              <a:rPr lang="pt-BR" sz="1800" dirty="0">
+              <a:rPr lang="pt-BR" sz="1600" dirty="0">
                 <a:latin typeface="Times New Roman" panose="02020603050405020304" pitchFamily="18" charset="0"/>
                 <a:cs typeface="Times New Roman" panose="02020603050405020304" pitchFamily="18" charset="0"/>
               </a:rPr>
@@ -7169,18 +7182,18 @@
               <a:buNone/>
             </a:pPr>
             <a:r>
-              <a:rPr lang="pt-BR" sz="1800" b="1" dirty="0" err="1">
+              <a:rPr lang="pt-BR" sz="1600" b="1" dirty="0" err="1">
                 <a:latin typeface="Times New Roman" panose="02020603050405020304" pitchFamily="18" charset="0"/>
                 <a:cs typeface="Times New Roman" panose="02020603050405020304" pitchFamily="18" charset="0"/>
               </a:rPr>
               <a:t>int</a:t>
             </a:r>
             <a:r>
-              <a:rPr lang="pt-BR" sz="1800" dirty="0">
-                <a:latin typeface="Times New Roman" panose="02020603050405020304" pitchFamily="18" charset="0"/>
-                <a:cs typeface="Times New Roman" panose="02020603050405020304" pitchFamily="18" charset="0"/>
-              </a:rPr>
-              <a:t> led8 = 8;</a:t>
+              <a:rPr lang="pt-BR" sz="1600" dirty="0">
+                <a:latin typeface="Times New Roman" panose="02020603050405020304" pitchFamily="18" charset="0"/>
+                <a:cs typeface="Times New Roman" panose="02020603050405020304" pitchFamily="18" charset="0"/>
+              </a:rPr>
+              <a:t> pinoLed9 = 9;</a:t>
             </a:r>
           </a:p>
           <a:p>
@@ -7188,18 +7201,18 @@
               <a:buNone/>
             </a:pPr>
             <a:r>
-              <a:rPr lang="pt-BR" sz="1800" b="1" dirty="0" err="1">
+              <a:rPr lang="pt-BR" sz="1600" b="1" dirty="0" err="1">
                 <a:latin typeface="Times New Roman" panose="02020603050405020304" pitchFamily="18" charset="0"/>
                 <a:cs typeface="Times New Roman" panose="02020603050405020304" pitchFamily="18" charset="0"/>
               </a:rPr>
               <a:t>int</a:t>
             </a:r>
             <a:r>
-              <a:rPr lang="pt-BR" sz="1800" dirty="0">
-                <a:latin typeface="Times New Roman" panose="02020603050405020304" pitchFamily="18" charset="0"/>
-                <a:cs typeface="Times New Roman" panose="02020603050405020304" pitchFamily="18" charset="0"/>
-              </a:rPr>
-              <a:t> led9 = 9;</a:t>
+              <a:rPr lang="pt-BR" sz="1600" dirty="0">
+                <a:latin typeface="Times New Roman" panose="02020603050405020304" pitchFamily="18" charset="0"/>
+                <a:cs typeface="Times New Roman" panose="02020603050405020304" pitchFamily="18" charset="0"/>
+              </a:rPr>
+              <a:t> pinoLed10 = 10;</a:t>
             </a:r>
           </a:p>
           <a:p>
@@ -7207,18 +7220,18 @@
               <a:buNone/>
             </a:pPr>
             <a:r>
-              <a:rPr lang="pt-BR" sz="1800" b="1" dirty="0" err="1">
+              <a:rPr lang="pt-BR" sz="1600" b="1" dirty="0" err="1">
                 <a:latin typeface="Times New Roman" panose="02020603050405020304" pitchFamily="18" charset="0"/>
                 <a:cs typeface="Times New Roman" panose="02020603050405020304" pitchFamily="18" charset="0"/>
               </a:rPr>
               <a:t>int</a:t>
             </a:r>
             <a:r>
-              <a:rPr lang="pt-BR" sz="1800" dirty="0">
-                <a:latin typeface="Times New Roman" panose="02020603050405020304" pitchFamily="18" charset="0"/>
-                <a:cs typeface="Times New Roman" panose="02020603050405020304" pitchFamily="18" charset="0"/>
-              </a:rPr>
-              <a:t> led10 = 10;</a:t>
+              <a:rPr lang="pt-BR" sz="1600" dirty="0">
+                <a:latin typeface="Times New Roman" panose="02020603050405020304" pitchFamily="18" charset="0"/>
+                <a:cs typeface="Times New Roman" panose="02020603050405020304" pitchFamily="18" charset="0"/>
+              </a:rPr>
+              <a:t> pinoLed11 = 11;</a:t>
             </a:r>
           </a:p>
           <a:p>
@@ -7226,18 +7239,18 @@
               <a:buNone/>
             </a:pPr>
             <a:r>
-              <a:rPr lang="pt-BR" sz="1800" b="1" dirty="0" err="1">
+              <a:rPr lang="pt-BR" sz="1600" b="1" dirty="0" err="1">
                 <a:latin typeface="Times New Roman" panose="02020603050405020304" pitchFamily="18" charset="0"/>
                 <a:cs typeface="Times New Roman" panose="02020603050405020304" pitchFamily="18" charset="0"/>
               </a:rPr>
               <a:t>int</a:t>
             </a:r>
             <a:r>
-              <a:rPr lang="pt-BR" sz="1800" dirty="0">
-                <a:latin typeface="Times New Roman" panose="02020603050405020304" pitchFamily="18" charset="0"/>
-                <a:cs typeface="Times New Roman" panose="02020603050405020304" pitchFamily="18" charset="0"/>
-              </a:rPr>
-              <a:t> led11 = 11;</a:t>
+              <a:rPr lang="pt-BR" sz="1600" dirty="0">
+                <a:latin typeface="Times New Roman" panose="02020603050405020304" pitchFamily="18" charset="0"/>
+                <a:cs typeface="Times New Roman" panose="02020603050405020304" pitchFamily="18" charset="0"/>
+              </a:rPr>
+              <a:t> pinoLed12 = 12;</a:t>
             </a:r>
           </a:p>
           <a:p>
@@ -7245,18 +7258,32 @@
               <a:buNone/>
             </a:pPr>
             <a:r>
-              <a:rPr lang="pt-BR" sz="1800" b="1" dirty="0" err="1">
-                <a:latin typeface="Times New Roman" panose="02020603050405020304" pitchFamily="18" charset="0"/>
-                <a:cs typeface="Times New Roman" panose="02020603050405020304" pitchFamily="18" charset="0"/>
-              </a:rPr>
-              <a:t>int</a:t>
-            </a:r>
-            <a:r>
-              <a:rPr lang="pt-BR" sz="1800" dirty="0">
-                <a:latin typeface="Times New Roman" panose="02020603050405020304" pitchFamily="18" charset="0"/>
-                <a:cs typeface="Times New Roman" panose="02020603050405020304" pitchFamily="18" charset="0"/>
-              </a:rPr>
-              <a:t> led12 = 12;</a:t>
+              <a:rPr lang="pt-BR" sz="1600" dirty="0" err="1">
+                <a:latin typeface="Times New Roman" panose="02020603050405020304" pitchFamily="18" charset="0"/>
+                <a:cs typeface="Times New Roman" panose="02020603050405020304" pitchFamily="18" charset="0"/>
+              </a:rPr>
+              <a:t>void</a:t>
+            </a:r>
+            <a:r>
+              <a:rPr lang="pt-BR" sz="1600" dirty="0">
+                <a:latin typeface="Times New Roman" panose="02020603050405020304" pitchFamily="18" charset="0"/>
+                <a:cs typeface="Times New Roman" panose="02020603050405020304" pitchFamily="18" charset="0"/>
+              </a:rPr>
+              <a:t> </a:t>
+            </a:r>
+            <a:r>
+              <a:rPr lang="pt-BR" sz="1600" b="1" dirty="0">
+                <a:latin typeface="Times New Roman" panose="02020603050405020304" pitchFamily="18" charset="0"/>
+                <a:cs typeface="Times New Roman" panose="02020603050405020304" pitchFamily="18" charset="0"/>
+              </a:rPr>
+              <a:t>setup</a:t>
+            </a:r>
+            <a:r>
+              <a:rPr lang="pt-BR" sz="1600" dirty="0">
+                <a:latin typeface="Times New Roman" panose="02020603050405020304" pitchFamily="18" charset="0"/>
+                <a:cs typeface="Times New Roman" panose="02020603050405020304" pitchFamily="18" charset="0"/>
+              </a:rPr>
+              <a:t>() {</a:t>
             </a:r>
           </a:p>
           <a:p>
@@ -7264,32 +7291,39 @@
               <a:buNone/>
             </a:pPr>
             <a:r>
-              <a:rPr lang="pt-BR" sz="1800" dirty="0" err="1">
-                <a:latin typeface="Times New Roman" panose="02020603050405020304" pitchFamily="18" charset="0"/>
-                <a:cs typeface="Times New Roman" panose="02020603050405020304" pitchFamily="18" charset="0"/>
-              </a:rPr>
-              <a:t>void</a:t>
-            </a:r>
-            <a:r>
-              <a:rPr lang="pt-BR" sz="1800" dirty="0">
-                <a:latin typeface="Times New Roman" panose="02020603050405020304" pitchFamily="18" charset="0"/>
-                <a:cs typeface="Times New Roman" panose="02020603050405020304" pitchFamily="18" charset="0"/>
-              </a:rPr>
-              <a:t> </a:t>
-            </a:r>
-            <a:r>
-              <a:rPr lang="pt-BR" sz="1800" b="1" dirty="0">
-                <a:latin typeface="Times New Roman" panose="02020603050405020304" pitchFamily="18" charset="0"/>
-                <a:cs typeface="Times New Roman" panose="02020603050405020304" pitchFamily="18" charset="0"/>
-              </a:rPr>
-              <a:t>setup</a:t>
-            </a:r>
-            <a:r>
-              <a:rPr lang="pt-BR" sz="1800" dirty="0">
-                <a:latin typeface="Times New Roman" panose="02020603050405020304" pitchFamily="18" charset="0"/>
-                <a:cs typeface="Times New Roman" panose="02020603050405020304" pitchFamily="18" charset="0"/>
-              </a:rPr>
-              <a:t>() {</a:t>
+              <a:rPr lang="pt-BR" sz="1600" dirty="0">
+                <a:latin typeface="Times New Roman" panose="02020603050405020304" pitchFamily="18" charset="0"/>
+                <a:cs typeface="Times New Roman" panose="02020603050405020304" pitchFamily="18" charset="0"/>
+              </a:rPr>
+              <a:t>  </a:t>
+            </a:r>
+            <a:r>
+              <a:rPr lang="pt-BR" sz="1600" b="1" dirty="0" err="1">
+                <a:latin typeface="Times New Roman" panose="02020603050405020304" pitchFamily="18" charset="0"/>
+                <a:cs typeface="Times New Roman" panose="02020603050405020304" pitchFamily="18" charset="0"/>
+              </a:rPr>
+              <a:t>pinMode</a:t>
+            </a:r>
+            <a:r>
+              <a:rPr lang="pt-BR" sz="1600" dirty="0">
+                <a:latin typeface="Times New Roman" panose="02020603050405020304" pitchFamily="18" charset="0"/>
+                <a:cs typeface="Times New Roman" panose="02020603050405020304" pitchFamily="18" charset="0"/>
+              </a:rPr>
+              <a:t>(pinoLed9, </a:t>
+            </a:r>
+            <a:r>
+              <a:rPr lang="pt-BR" sz="1600" b="1" dirty="0">
+                <a:latin typeface="Times New Roman" panose="02020603050405020304" pitchFamily="18" charset="0"/>
+                <a:cs typeface="Times New Roman" panose="02020603050405020304" pitchFamily="18" charset="0"/>
+              </a:rPr>
+              <a:t>OUTPUT</a:t>
+            </a:r>
+            <a:r>
+              <a:rPr lang="pt-BR" sz="1600" dirty="0">
+                <a:latin typeface="Times New Roman" panose="02020603050405020304" pitchFamily="18" charset="0"/>
+                <a:cs typeface="Times New Roman" panose="02020603050405020304" pitchFamily="18" charset="0"/>
+              </a:rPr>
+              <a:t>);</a:t>
             </a:r>
           </a:p>
           <a:p>
@@ -7297,35 +7331,35 @@
               <a:buNone/>
             </a:pPr>
             <a:r>
-              <a:rPr lang="pt-BR" sz="1800" dirty="0">
+              <a:rPr lang="pt-BR" sz="1600" dirty="0">
                 <a:latin typeface="Times New Roman" panose="02020603050405020304" pitchFamily="18" charset="0"/>
                 <a:cs typeface="Times New Roman" panose="02020603050405020304" pitchFamily="18" charset="0"/>
               </a:rPr>
               <a:t>  </a:t>
             </a:r>
             <a:r>
-              <a:rPr lang="pt-BR" sz="1800" b="1" dirty="0" err="1">
+              <a:rPr lang="pt-BR" sz="1600" b="1" dirty="0" err="1">
                 <a:latin typeface="Times New Roman" panose="02020603050405020304" pitchFamily="18" charset="0"/>
                 <a:cs typeface="Times New Roman" panose="02020603050405020304" pitchFamily="18" charset="0"/>
               </a:rPr>
               <a:t>pinMode</a:t>
             </a:r>
             <a:r>
-              <a:rPr lang="pt-BR" sz="1800" dirty="0">
-                <a:latin typeface="Times New Roman" panose="02020603050405020304" pitchFamily="18" charset="0"/>
-                <a:cs typeface="Times New Roman" panose="02020603050405020304" pitchFamily="18" charset="0"/>
-              </a:rPr>
-              <a:t>(led9, </a:t>
-            </a:r>
-            <a:r>
-              <a:rPr lang="pt-BR" sz="1800" b="1" dirty="0">
+              <a:rPr lang="pt-BR" sz="1600" dirty="0">
+                <a:latin typeface="Times New Roman" panose="02020603050405020304" pitchFamily="18" charset="0"/>
+                <a:cs typeface="Times New Roman" panose="02020603050405020304" pitchFamily="18" charset="0"/>
+              </a:rPr>
+              <a:t>(pinoLed10, </a:t>
+            </a:r>
+            <a:r>
+              <a:rPr lang="pt-BR" sz="1600" b="1" dirty="0">
                 <a:latin typeface="Times New Roman" panose="02020603050405020304" pitchFamily="18" charset="0"/>
                 <a:cs typeface="Times New Roman" panose="02020603050405020304" pitchFamily="18" charset="0"/>
               </a:rPr>
               <a:t>OUTPUT</a:t>
             </a:r>
             <a:r>
-              <a:rPr lang="pt-BR" sz="1800" dirty="0">
+              <a:rPr lang="pt-BR" sz="1600" dirty="0">
                 <a:latin typeface="Times New Roman" panose="02020603050405020304" pitchFamily="18" charset="0"/>
                 <a:cs typeface="Times New Roman" panose="02020603050405020304" pitchFamily="18" charset="0"/>
               </a:rPr>
@@ -7337,35 +7371,35 @@
               <a:buNone/>
             </a:pPr>
             <a:r>
-              <a:rPr lang="pt-BR" sz="1800" dirty="0">
+              <a:rPr lang="pt-BR" sz="1600" dirty="0">
                 <a:latin typeface="Times New Roman" panose="02020603050405020304" pitchFamily="18" charset="0"/>
                 <a:cs typeface="Times New Roman" panose="02020603050405020304" pitchFamily="18" charset="0"/>
               </a:rPr>
               <a:t>  </a:t>
             </a:r>
             <a:r>
-              <a:rPr lang="pt-BR" sz="1800" b="1" dirty="0" err="1">
+              <a:rPr lang="pt-BR" sz="1600" b="1" dirty="0" err="1">
                 <a:latin typeface="Times New Roman" panose="02020603050405020304" pitchFamily="18" charset="0"/>
                 <a:cs typeface="Times New Roman" panose="02020603050405020304" pitchFamily="18" charset="0"/>
               </a:rPr>
               <a:t>pinMode</a:t>
             </a:r>
             <a:r>
-              <a:rPr lang="pt-BR" sz="1800" dirty="0">
-                <a:latin typeface="Times New Roman" panose="02020603050405020304" pitchFamily="18" charset="0"/>
-                <a:cs typeface="Times New Roman" panose="02020603050405020304" pitchFamily="18" charset="0"/>
-              </a:rPr>
-              <a:t>(led10, </a:t>
-            </a:r>
-            <a:r>
-              <a:rPr lang="pt-BR" sz="1800" b="1" dirty="0">
+              <a:rPr lang="pt-BR" sz="1600" dirty="0">
+                <a:latin typeface="Times New Roman" panose="02020603050405020304" pitchFamily="18" charset="0"/>
+                <a:cs typeface="Times New Roman" panose="02020603050405020304" pitchFamily="18" charset="0"/>
+              </a:rPr>
+              <a:t>(pinoLed11, </a:t>
+            </a:r>
+            <a:r>
+              <a:rPr lang="pt-BR" sz="1600" b="1" dirty="0">
                 <a:latin typeface="Times New Roman" panose="02020603050405020304" pitchFamily="18" charset="0"/>
                 <a:cs typeface="Times New Roman" panose="02020603050405020304" pitchFamily="18" charset="0"/>
               </a:rPr>
               <a:t>OUTPUT</a:t>
             </a:r>
             <a:r>
-              <a:rPr lang="pt-BR" sz="1800" dirty="0">
+              <a:rPr lang="pt-BR" sz="1600" dirty="0">
                 <a:latin typeface="Times New Roman" panose="02020603050405020304" pitchFamily="18" charset="0"/>
                 <a:cs typeface="Times New Roman" panose="02020603050405020304" pitchFamily="18" charset="0"/>
               </a:rPr>
@@ -7377,68 +7411,28 @@
               <a:buNone/>
             </a:pPr>
             <a:r>
-              <a:rPr lang="pt-BR" sz="1800" dirty="0">
+              <a:rPr lang="pt-BR" sz="1600" dirty="0">
                 <a:latin typeface="Times New Roman" panose="02020603050405020304" pitchFamily="18" charset="0"/>
                 <a:cs typeface="Times New Roman" panose="02020603050405020304" pitchFamily="18" charset="0"/>
               </a:rPr>
               <a:t>  </a:t>
             </a:r>
             <a:r>
-              <a:rPr lang="pt-BR" sz="1800" b="1" dirty="0" err="1">
+              <a:rPr lang="pt-BR" sz="1600" b="1" dirty="0" err="1">
                 <a:latin typeface="Times New Roman" panose="02020603050405020304" pitchFamily="18" charset="0"/>
                 <a:cs typeface="Times New Roman" panose="02020603050405020304" pitchFamily="18" charset="0"/>
               </a:rPr>
               <a:t>pinMode</a:t>
             </a:r>
             <a:r>
-              <a:rPr lang="pt-BR" sz="1800" dirty="0">
-                <a:latin typeface="Times New Roman" panose="02020603050405020304" pitchFamily="18" charset="0"/>
-                <a:cs typeface="Times New Roman" panose="02020603050405020304" pitchFamily="18" charset="0"/>
-              </a:rPr>
-              <a:t>(led11, </a:t>
-            </a:r>
-            <a:r>
-              <a:rPr lang="pt-BR" sz="1800" b="1" dirty="0">
-                <a:latin typeface="Times New Roman" panose="02020603050405020304" pitchFamily="18" charset="0"/>
-                <a:cs typeface="Times New Roman" panose="02020603050405020304" pitchFamily="18" charset="0"/>
-              </a:rPr>
-              <a:t>OUTPUT</a:t>
-            </a:r>
-            <a:r>
-              <a:rPr lang="pt-BR" sz="1800" dirty="0">
-                <a:latin typeface="Times New Roman" panose="02020603050405020304" pitchFamily="18" charset="0"/>
-                <a:cs typeface="Times New Roman" panose="02020603050405020304" pitchFamily="18" charset="0"/>
-              </a:rPr>
-              <a:t>);</a:t>
-            </a:r>
-          </a:p>
-          <a:p>
-            <a:pPr marL="0" indent="0">
-              <a:buNone/>
-            </a:pPr>
-            <a:r>
-              <a:rPr lang="pt-BR" sz="1800" dirty="0">
-                <a:latin typeface="Times New Roman" panose="02020603050405020304" pitchFamily="18" charset="0"/>
-                <a:cs typeface="Times New Roman" panose="02020603050405020304" pitchFamily="18" charset="0"/>
-              </a:rPr>
-              <a:t>  </a:t>
-            </a:r>
-            <a:r>
-              <a:rPr lang="pt-BR" sz="1800" b="1" dirty="0" err="1">
-                <a:latin typeface="Times New Roman" panose="02020603050405020304" pitchFamily="18" charset="0"/>
-                <a:cs typeface="Times New Roman" panose="02020603050405020304" pitchFamily="18" charset="0"/>
-              </a:rPr>
-              <a:t>pinMode</a:t>
-            </a:r>
-            <a:r>
-              <a:rPr lang="pt-BR" sz="1800" dirty="0">
-                <a:latin typeface="Times New Roman" panose="02020603050405020304" pitchFamily="18" charset="0"/>
-                <a:cs typeface="Times New Roman" panose="02020603050405020304" pitchFamily="18" charset="0"/>
-              </a:rPr>
-              <a:t>(led12, </a:t>
-            </a:r>
-            <a:r>
-              <a:rPr lang="pt-BR" sz="1800" b="1" dirty="0">
+              <a:rPr lang="pt-BR" sz="1600" dirty="0">
+                <a:latin typeface="Times New Roman" panose="02020603050405020304" pitchFamily="18" charset="0"/>
+                <a:cs typeface="Times New Roman" panose="02020603050405020304" pitchFamily="18" charset="0"/>
+              </a:rPr>
+              <a:t>(pinoLed12, </a:t>
+            </a:r>
+            <a:r>
+              <a:rPr lang="pt-BR" sz="1600" b="1" dirty="0">
                 <a:latin typeface="Times New Roman" panose="02020603050405020304" pitchFamily="18" charset="0"/>
                 <a:cs typeface="Times New Roman" panose="02020603050405020304" pitchFamily="18" charset="0"/>
               </a:rPr>
@@ -7608,7 +7602,7 @@
                 <a:latin typeface="Times New Roman" panose="02020603050405020304" pitchFamily="18" charset="0"/>
                 <a:cs typeface="Times New Roman" panose="02020603050405020304" pitchFamily="18" charset="0"/>
               </a:rPr>
-              <a:t>(led9, HIGH);</a:t>
+              <a:t>(pinoLed9, HIGH);</a:t>
             </a:r>
           </a:p>
           <a:p>
@@ -7688,7 +7682,7 @@
                 <a:latin typeface="Times New Roman" panose="02020603050405020304" pitchFamily="18" charset="0"/>
                 <a:cs typeface="Times New Roman" panose="02020603050405020304" pitchFamily="18" charset="0"/>
               </a:rPr>
-              <a:t>(led9, LOW);</a:t>
+              <a:t>(pinoLed9, LOW);</a:t>
             </a:r>
           </a:p>
           <a:p>
@@ -7768,7 +7762,7 @@
                 <a:latin typeface="Times New Roman" panose="02020603050405020304" pitchFamily="18" charset="0"/>
                 <a:cs typeface="Times New Roman" panose="02020603050405020304" pitchFamily="18" charset="0"/>
               </a:rPr>
-              <a:t>(led10, HIGH);</a:t>
+              <a:t>(pinoLed10, HIGH);</a:t>
             </a:r>
           </a:p>
           <a:p>
@@ -7848,7 +7842,7 @@
                 <a:latin typeface="Times New Roman" panose="02020603050405020304" pitchFamily="18" charset="0"/>
                 <a:cs typeface="Times New Roman" panose="02020603050405020304" pitchFamily="18" charset="0"/>
               </a:rPr>
-              <a:t>(led10, LOW);</a:t>
+              <a:t>(pinoLed10, LOW);</a:t>
             </a:r>
           </a:p>
           <a:p>
@@ -7928,7 +7922,7 @@
                 <a:latin typeface="Times New Roman" panose="02020603050405020304" pitchFamily="18" charset="0"/>
                 <a:cs typeface="Times New Roman" panose="02020603050405020304" pitchFamily="18" charset="0"/>
               </a:rPr>
-              <a:t>(led11, HIGH);</a:t>
+              <a:t>(pinoLed11, HIGH);</a:t>
             </a:r>
           </a:p>
           <a:p>
@@ -8008,7 +8002,7 @@
                 <a:latin typeface="Times New Roman" panose="02020603050405020304" pitchFamily="18" charset="0"/>
                 <a:cs typeface="Times New Roman" panose="02020603050405020304" pitchFamily="18" charset="0"/>
               </a:rPr>
-              <a:t>(led11, LOW);</a:t>
+              <a:t>(pinoLed11, LOW);</a:t>
             </a:r>
           </a:p>
           <a:p>
@@ -8088,7 +8082,7 @@
                 <a:latin typeface="Times New Roman" panose="02020603050405020304" pitchFamily="18" charset="0"/>
                 <a:cs typeface="Times New Roman" panose="02020603050405020304" pitchFamily="18" charset="0"/>
               </a:rPr>
-              <a:t>(led12, HIGH);</a:t>
+              <a:t>(pinoLed12, HIGH);</a:t>
             </a:r>
           </a:p>
           <a:p>
@@ -8168,7 +8162,7 @@
                 <a:latin typeface="Times New Roman" panose="02020603050405020304" pitchFamily="18" charset="0"/>
                 <a:cs typeface="Times New Roman" panose="02020603050405020304" pitchFamily="18" charset="0"/>
               </a:rPr>
-              <a:t>(led12, LOW);</a:t>
+              <a:t>(pinoLed12, LOW);</a:t>
             </a:r>
           </a:p>
           <a:p>
@@ -9140,8 +9134,8 @@
         </p:nvSpPr>
         <p:spPr>
           <a:xfrm>
-            <a:off x="142865" y="914400"/>
-            <a:ext cx="8865056" cy="3864864"/>
+            <a:off x="142865" y="914399"/>
+            <a:ext cx="8865056" cy="4105487"/>
           </a:xfrm>
         </p:spPr>
         <p:txBody>
@@ -9224,7 +9218,35 @@
                 <a:latin typeface="Times New Roman" panose="02020603050405020304" pitchFamily="18" charset="0"/>
                 <a:cs typeface="Times New Roman" panose="02020603050405020304" pitchFamily="18" charset="0"/>
               </a:rPr>
-              <a:t> segundos = 0; // contador de segundos</a:t>
+              <a:t> </a:t>
+            </a:r>
+            <a:r>
+              <a:rPr lang="pt-BR" sz="2000" dirty="0" err="1">
+                <a:latin typeface="Times New Roman" panose="02020603050405020304" pitchFamily="18" charset="0"/>
+                <a:cs typeface="Times New Roman" panose="02020603050405020304" pitchFamily="18" charset="0"/>
+              </a:rPr>
+              <a:t>cont_segs</a:t>
+            </a:r>
+            <a:r>
+              <a:rPr lang="pt-BR" sz="2000" dirty="0">
+                <a:latin typeface="Times New Roman" panose="02020603050405020304" pitchFamily="18" charset="0"/>
+                <a:cs typeface="Times New Roman" panose="02020603050405020304" pitchFamily="18" charset="0"/>
+              </a:rPr>
+              <a:t> </a:t>
+            </a:r>
+            <a:r>
+              <a:rPr lang="pt-BR" sz="2000">
+                <a:latin typeface="Times New Roman" panose="02020603050405020304" pitchFamily="18" charset="0"/>
+                <a:cs typeface="Times New Roman" panose="02020603050405020304" pitchFamily="18" charset="0"/>
+              </a:rPr>
+              <a:t>= 1; </a:t>
+            </a:r>
+            <a:r>
+              <a:rPr lang="pt-BR" sz="2000" dirty="0">
+                <a:latin typeface="Times New Roman" panose="02020603050405020304" pitchFamily="18" charset="0"/>
+                <a:cs typeface="Times New Roman" panose="02020603050405020304" pitchFamily="18" charset="0"/>
+              </a:rPr>
+              <a:t>// contador de segundos</a:t>
             </a:r>
           </a:p>
           <a:p>
@@ -9356,21 +9378,24 @@
                 <a:latin typeface="Times New Roman" panose="02020603050405020304" pitchFamily="18" charset="0"/>
                 <a:cs typeface="Times New Roman" panose="02020603050405020304" pitchFamily="18" charset="0"/>
               </a:rPr>
-              <a:t>("</a:t>
-            </a:r>
-            <a:r>
-              <a:rPr lang="pt-BR" sz="2000" dirty="0" err="1">
-                <a:latin typeface="Times New Roman" panose="02020603050405020304" pitchFamily="18" charset="0"/>
-                <a:cs typeface="Times New Roman" panose="02020603050405020304" pitchFamily="18" charset="0"/>
-              </a:rPr>
-              <a:t>hello</a:t>
-            </a:r>
-            <a:r>
-              <a:rPr lang="pt-BR" sz="2000" dirty="0">
-                <a:latin typeface="Times New Roman" panose="02020603050405020304" pitchFamily="18" charset="0"/>
-                <a:cs typeface="Times New Roman" panose="02020603050405020304" pitchFamily="18" charset="0"/>
-              </a:rPr>
-              <a:t> world"); }</a:t>
+              <a:t>(“</a:t>
+            </a:r>
+            <a:r>
+              <a:rPr lang="pt-BR" sz="2000" b="1" dirty="0">
+                <a:solidFill>
+                  <a:srgbClr val="0070C0"/>
+                </a:solidFill>
+                <a:latin typeface="Times New Roman" panose="02020603050405020304" pitchFamily="18" charset="0"/>
+                <a:cs typeface="Times New Roman" panose="02020603050405020304" pitchFamily="18" charset="0"/>
+              </a:rPr>
+              <a:t>Senha</a:t>
+            </a:r>
+            <a:r>
+              <a:rPr lang="pt-BR" sz="2000" dirty="0">
+                <a:latin typeface="Times New Roman" panose="02020603050405020304" pitchFamily="18" charset="0"/>
+                <a:cs typeface="Times New Roman" panose="02020603050405020304" pitchFamily="18" charset="0"/>
+              </a:rPr>
+              <a:t>"); }</a:t>
             </a:r>
           </a:p>
           <a:p>
@@ -9398,8 +9423,8 @@
         </p:nvSpPr>
         <p:spPr>
           <a:xfrm>
-            <a:off x="3456431" y="2465342"/>
-            <a:ext cx="5544703" cy="2554545"/>
+            <a:off x="3980687" y="2465342"/>
+            <a:ext cx="4919473" cy="2554545"/>
           </a:xfrm>
           <a:prstGeom prst="rect">
             <a:avLst/>
@@ -9513,7 +9538,21 @@
                 <a:latin typeface="Times New Roman" panose="02020603050405020304" pitchFamily="18" charset="0"/>
                 <a:cs typeface="Times New Roman" panose="02020603050405020304" pitchFamily="18" charset="0"/>
               </a:rPr>
-              <a:t>(segundos);</a:t>
+              <a:t>(</a:t>
+            </a:r>
+            <a:r>
+              <a:rPr lang="pt-BR" sz="2000" dirty="0" err="1">
+                <a:latin typeface="Times New Roman" panose="02020603050405020304" pitchFamily="18" charset="0"/>
+                <a:cs typeface="Times New Roman" panose="02020603050405020304" pitchFamily="18" charset="0"/>
+              </a:rPr>
+              <a:t>cont_segs</a:t>
+            </a:r>
+            <a:r>
+              <a:rPr lang="pt-BR" sz="2000" dirty="0">
+                <a:latin typeface="Times New Roman" panose="02020603050405020304" pitchFamily="18" charset="0"/>
+                <a:cs typeface="Times New Roman" panose="02020603050405020304" pitchFamily="18" charset="0"/>
+              </a:rPr>
+              <a:t>);</a:t>
             </a:r>
           </a:p>
           <a:p>
@@ -9657,7 +9696,21 @@
                 <a:latin typeface="Times New Roman" panose="02020603050405020304" pitchFamily="18" charset="0"/>
                 <a:cs typeface="Times New Roman" panose="02020603050405020304" pitchFamily="18" charset="0"/>
               </a:rPr>
-              <a:t> segundos += 1; }</a:t>
+              <a:t> </a:t>
+            </a:r>
+            <a:r>
+              <a:rPr lang="pt-BR" sz="2000" dirty="0" err="1">
+                <a:latin typeface="Times New Roman" panose="02020603050405020304" pitchFamily="18" charset="0"/>
+                <a:cs typeface="Times New Roman" panose="02020603050405020304" pitchFamily="18" charset="0"/>
+              </a:rPr>
+              <a:t>cont_segs</a:t>
+            </a:r>
+            <a:r>
+              <a:rPr lang="pt-BR" sz="2000" dirty="0">
+                <a:latin typeface="Times New Roman" panose="02020603050405020304" pitchFamily="18" charset="0"/>
+                <a:cs typeface="Times New Roman" panose="02020603050405020304" pitchFamily="18" charset="0"/>
+              </a:rPr>
+              <a:t> += 1; }</a:t>
             </a:r>
             <a:endParaRPr lang="pt-BR" sz="2000" dirty="0">
               <a:solidFill>
@@ -10396,7 +10449,7 @@
                 <a:latin typeface="Times New Roman" panose="02020603050405020304" pitchFamily="18" charset="0"/>
                 <a:cs typeface="Times New Roman" panose="02020603050405020304" pitchFamily="18" charset="0"/>
               </a:rPr>
-              <a:t>Otimizar o código do projeto 3 utilizando a estrutura de repetição </a:t>
+              <a:t>Otimizar o código do projeto 3 utilizando estrutura de repetição </a:t>
             </a:r>
             <a:r>
               <a:rPr lang="pt-BR" sz="2000" b="1" dirty="0">
@@ -13115,62 +13168,6 @@
               </a:rPr>
               <a:t>Expositores</a:t>
             </a:r>
-          </a:p>
-        </p:txBody>
-      </p:sp>
-      <p:sp>
-        <p:nvSpPr>
-          <p:cNvPr id="3" name="CaixaDeTexto 2">
-            <a:extLst>
-              <a:ext uri="{FF2B5EF4-FFF2-40B4-BE49-F238E27FC236}">
-                <a16:creationId xmlns:a16="http://schemas.microsoft.com/office/drawing/2014/main" id="{A161C935-F27D-A572-711A-F477D4BC1E7B}"/>
-              </a:ext>
-            </a:extLst>
-          </p:cNvPr>
-          <p:cNvSpPr txBox="1"/>
-          <p:nvPr/>
-        </p:nvSpPr>
-        <p:spPr>
-          <a:xfrm>
-            <a:off x="2286000" y="2387846"/>
-            <a:ext cx="4572000" cy="369332"/>
-          </a:xfrm>
-          <a:prstGeom prst="rect">
-            <a:avLst/>
-          </a:prstGeom>
-          <a:noFill/>
-          <a:ln w="12700" cap="flat">
-            <a:noFill/>
-            <a:miter lim="400000"/>
-          </a:ln>
-          <a:effectLst/>
-        </p:spPr>
-        <p:style>
-          <a:lnRef idx="0">
-            <a:scrgbClr r="0" g="0" b="0"/>
-          </a:lnRef>
-          <a:fillRef idx="0">
-            <a:scrgbClr r="0" g="0" b="0"/>
-          </a:fillRef>
-          <a:effectRef idx="0">
-            <a:scrgbClr r="0" g="0" b="0"/>
-          </a:effectRef>
-          <a:fontRef idx="none"/>
-        </p:style>
-        <p:txBody>
-          <a:bodyPr wrap="square">
-            <a:spAutoFit/>
-          </a:bodyPr>
-          <a:lstStyle/>
-          <a:p>
-            <a:r>
-              <a:rPr lang="pt-BR" sz="1800" dirty="0">
-                <a:latin typeface="Times New Roman" panose="02020603050405020304" pitchFamily="18" charset="0"/>
-                <a:cs typeface="Times New Roman" panose="02020603050405020304" pitchFamily="18" charset="0"/>
-              </a:rPr>
-              <a:t>tempo</a:t>
-            </a:r>
-            <a:endParaRPr lang="pt-BR" dirty="0"/>
           </a:p>
         </p:txBody>
       </p:sp>

</xml_diff>